<commit_message>
Updating TestApi.pptx according to the ObjectComparison API changes.
</commit_message>
<xml_diff>
--- a/Development/Documentation/Concepts/TestApi.pptx
+++ b/Development/Documentation/Concepts/TestApi.pptx
@@ -215,7 +215,7 @@
             <a:fld id="{441455B0-54CD-4603-856A-E31B3BD1F89C}" type="datetimeFigureOut">
               <a:rPr lang="en-US" smtClean="0"/>
               <a:pPr/>
-              <a:t>6/16/2010</a:t>
+              <a:t>2/1/2011</a:t>
             </a:fld>
             <a:endParaRPr lang="en-US"/>
           </a:p>
@@ -384,6 +384,11 @@
         </p:txBody>
       </p:sp>
     </p:spTree>
+    <p:extLst>
+      <p:ext uri="{BB962C8B-B14F-4D97-AF65-F5344CB8AC3E}">
+        <p14:creationId xmlns:p14="http://schemas.microsoft.com/office/powerpoint/2010/main" val="457545589"/>
+      </p:ext>
+    </p:extLst>
   </p:cSld>
   <p:clrMap bg1="lt1" tx1="dk1" bg2="lt2" tx2="dk2" accent1="accent1" accent2="accent2" accent3="accent3" accent4="accent4" accent5="accent5" accent6="accent6" hlink="hlink" folHlink="folHlink"/>
   <p:notesStyle>
@@ -568,11 +573,7 @@
         </p:txBody>
       </p:sp>
     </p:spTree>
-    <p:extLst>
-      <p:ext uri="{BB962C8B-B14F-4D97-AF65-F5344CB8AC3E}">
-        <p14:creationId xmlns="" xmlns:p14="http://schemas.microsoft.com/office/powerpoint/2007/7/12/main" val="1208194935"/>
-      </p:ext>
-    </p:extLst>
+    <p:extLst/>
   </p:cSld>
   <p:clrMapOvr>
     <a:masterClrMapping/>
@@ -948,19 +949,11 @@
           <a:p>
             <a:r>
               <a:rPr lang="en-US" dirty="0" smtClean="0"/>
-              <a:t>Note that the API also supports weighted </a:t>
-            </a:r>
-            <a:r>
-              <a:rPr lang="en-US" dirty="0" smtClean="0"/>
-              <a:t>parameters </a:t>
+              <a:t>Note that the API also supports weighted parameters </a:t>
             </a:r>
             <a:r>
               <a:rPr lang="en-US" baseline="0" dirty="0" smtClean="0"/>
-              <a:t>as </a:t>
-            </a:r>
-            <a:r>
-              <a:rPr lang="en-US" baseline="0" dirty="0" smtClean="0"/>
-              <a:t>well as “tagged parameter values” for negative testing, etc.</a:t>
+              <a:t>as well as “tagged parameter values” for negative testing, etc.</a:t>
             </a:r>
             <a:endParaRPr lang="en-US" dirty="0"/>
           </a:p>
@@ -1493,11 +1486,15 @@
           <a:p>
             <a:r>
               <a:rPr lang="en-US" dirty="0" err="1" smtClean="0"/>
-              <a:t>ObjectComparer</a:t>
+              <a:t>ObjectGraphComparer</a:t>
             </a:r>
             <a:r>
               <a:rPr lang="en-US" dirty="0" smtClean="0"/>
-              <a:t> is a sealed class (cannot be extended)</a:t>
+              <a:t> </a:t>
+            </a:r>
+            <a:r>
+              <a:rPr lang="en-US" dirty="0" smtClean="0"/>
+              <a:t>is a sealed class (cannot be extended)</a:t>
             </a:r>
           </a:p>
           <a:p>
@@ -1564,6 +1561,33 @@
             <a:r>
               <a:rPr lang="en-US" baseline="0" dirty="0" smtClean="0"/>
               <a:t> members. </a:t>
+            </a:r>
+            <a:endParaRPr lang="en-US" baseline="0" dirty="0" smtClean="0"/>
+          </a:p>
+          <a:p>
+            <a:endParaRPr lang="en-US" baseline="0" dirty="0" smtClean="0"/>
+          </a:p>
+          <a:p>
+            <a:r>
+              <a:rPr lang="en-US" baseline="0" dirty="0" err="1" smtClean="0"/>
+              <a:t>ObjectGraphCodec</a:t>
+            </a:r>
+            <a:r>
+              <a:rPr lang="en-US" baseline="0" dirty="0" smtClean="0"/>
+              <a:t> is an abstract class with Encode and Decode methods which correspondingly serialize object graphs to and deserialize them from arbitrary streams.</a:t>
+            </a:r>
+          </a:p>
+          <a:p>
+            <a:endParaRPr lang="en-US" baseline="0" dirty="0" smtClean="0"/>
+          </a:p>
+          <a:p>
+            <a:r>
+              <a:rPr lang="en-US" baseline="0" dirty="0" err="1" smtClean="0"/>
+              <a:t>ObjectGraphComparisonStrategy</a:t>
+            </a:r>
+            <a:r>
+              <a:rPr lang="en-US" baseline="0" dirty="0" smtClean="0"/>
+              <a:t> is an abstract class with a single method Compare, which compares two graph nodes and/or their children. It allows to override the default comparison algorithm.</a:t>
             </a:r>
             <a:endParaRPr lang="en-US" dirty="0"/>
           </a:p>
@@ -1865,7 +1889,7 @@
             <a:fld id="{4192CA26-8A80-48B3-8A37-C87930463EDF}" type="datetime1">
               <a:rPr lang="en-US" smtClean="0"/>
               <a:pPr/>
-              <a:t>6/16/2010</a:t>
+              <a:t>2/1/2011</a:t>
             </a:fld>
             <a:endParaRPr lang="en-US"/>
           </a:p>
@@ -2032,7 +2056,7 @@
             <a:fld id="{70CC42B5-DC0B-4183-AC13-4EBAA8D66E66}" type="datetime1">
               <a:rPr lang="en-US" smtClean="0"/>
               <a:pPr/>
-              <a:t>6/16/2010</a:t>
+              <a:t>2/1/2011</a:t>
             </a:fld>
             <a:endParaRPr lang="en-US"/>
           </a:p>
@@ -2209,7 +2233,7 @@
             <a:fld id="{45819D47-20B3-4FCC-882B-7735EE428B34}" type="datetime1">
               <a:rPr lang="en-US" smtClean="0"/>
               <a:pPr/>
-              <a:t>6/16/2010</a:t>
+              <a:t>2/1/2011</a:t>
             </a:fld>
             <a:endParaRPr lang="en-US"/>
           </a:p>
@@ -2376,7 +2400,7 @@
             <a:fld id="{8B93C4C5-EC27-436A-B55B-62AB0609CBDC}" type="datetime1">
               <a:rPr lang="en-US" smtClean="0"/>
               <a:pPr/>
-              <a:t>6/16/2010</a:t>
+              <a:t>2/1/2011</a:t>
             </a:fld>
             <a:endParaRPr lang="en-US"/>
           </a:p>
@@ -2619,7 +2643,7 @@
             <a:fld id="{34B590A1-EA2D-422B-B99C-934FF4647678}" type="datetime1">
               <a:rPr lang="en-US" smtClean="0"/>
               <a:pPr/>
-              <a:t>6/16/2010</a:t>
+              <a:t>2/1/2011</a:t>
             </a:fld>
             <a:endParaRPr lang="en-US"/>
           </a:p>
@@ -2904,7 +2928,7 @@
             <a:fld id="{2A9B11EE-26FD-40AB-B360-2D0CEB4A4C39}" type="datetime1">
               <a:rPr lang="en-US" smtClean="0"/>
               <a:pPr/>
-              <a:t>6/16/2010</a:t>
+              <a:t>2/1/2011</a:t>
             </a:fld>
             <a:endParaRPr lang="en-US"/>
           </a:p>
@@ -3323,7 +3347,7 @@
             <a:fld id="{69675C57-BFAB-462C-9356-69D7A460F2B9}" type="datetime1">
               <a:rPr lang="en-US" smtClean="0"/>
               <a:pPr/>
-              <a:t>6/16/2010</a:t>
+              <a:t>2/1/2011</a:t>
             </a:fld>
             <a:endParaRPr lang="en-US"/>
           </a:p>
@@ -3438,7 +3462,7 @@
             <a:fld id="{52B3F60E-17DB-4136-B91C-CDE03857F8F5}" type="datetime1">
               <a:rPr lang="en-US" smtClean="0"/>
               <a:pPr/>
-              <a:t>6/16/2010</a:t>
+              <a:t>2/1/2011</a:t>
             </a:fld>
             <a:endParaRPr lang="en-US"/>
           </a:p>
@@ -3530,7 +3554,7 @@
             <a:fld id="{B12CD196-0F24-41BF-A7DC-F1433C175BA9}" type="datetime1">
               <a:rPr lang="en-US" smtClean="0"/>
               <a:pPr/>
-              <a:t>6/16/2010</a:t>
+              <a:t>2/1/2011</a:t>
             </a:fld>
             <a:endParaRPr lang="en-US"/>
           </a:p>
@@ -3804,7 +3828,7 @@
             <a:fld id="{790DC1BC-CADC-4384-9D1C-989658B02D38}" type="datetime1">
               <a:rPr lang="en-US" smtClean="0"/>
               <a:pPr/>
-              <a:t>6/16/2010</a:t>
+              <a:t>2/1/2011</a:t>
             </a:fld>
             <a:endParaRPr lang="en-US"/>
           </a:p>
@@ -4054,7 +4078,7 @@
             <a:fld id="{0A4E433E-0CE3-4FC2-A6E4-8A9C50D61C60}" type="datetime1">
               <a:rPr lang="en-US" smtClean="0"/>
               <a:pPr/>
-              <a:t>6/16/2010</a:t>
+              <a:t>2/1/2011</a:t>
             </a:fld>
             <a:endParaRPr lang="en-US"/>
           </a:p>
@@ -4282,7 +4306,7 @@
             <a:fld id="{9483A323-DC33-430C-8F48-3489E435D64D}" type="datetime1">
               <a:rPr lang="en-US" smtClean="0"/>
               <a:pPr/>
-              <a:t>6/16/2010</a:t>
+              <a:t>2/1/2011</a:t>
             </a:fld>
             <a:endParaRPr lang="en-US"/>
           </a:p>
@@ -4999,11 +5023,7 @@
         </p:nvPicPr>
         <p:blipFill>
           <a:blip r:embed="rId3" cstate="print">
-            <a:extLst>
-              <a:ext uri="28A0092B-C50C-407e-A947-70E740481C1C">
-                <a14:useLocalDpi xmlns="" xmlns:a14="http://schemas.microsoft.com/office/drawing/2007/7/7/main" val="0"/>
-              </a:ext>
-            </a:extLst>
+            <a:extLst/>
           </a:blip>
           <a:srcRect/>
           <a:stretch>
@@ -5031,25 +5051,7 @@
             </a:camera>
             <a:lightRig rig="threePt" dir="t"/>
           </a:scene3d>
-          <a:extLst>
-            <a:ext uri="{909E8E84-426E-40dd-AFC4-6F175D3DCCD1}">
-              <a14:hiddenFill xmlns="" xmlns:a14="http://schemas.microsoft.com/office/drawing/2007/7/7/main">
-                <a:solidFill>
-                  <a:schemeClr val="accent1"/>
-                </a:solidFill>
-              </a14:hiddenFill>
-            </a:ext>
-            <a:ext uri="{91240B29-F687-4f45-9708-019B960494DF}">
-              <a14:hiddenLine xmlns="" xmlns:a14="http://schemas.microsoft.com/office/drawing/2007/7/7/main" w="9525">
-                <a:solidFill>
-                  <a:schemeClr val="tx1"/>
-                </a:solidFill>
-                <a:miter lim="800000"/>
-                <a:headEnd/>
-                <a:tailEnd/>
-              </a14:hiddenLine>
-            </a:ext>
-          </a:extLst>
+          <a:extLst/>
         </p:spPr>
       </p:pic>
       <p:pic>
@@ -5062,11 +5064,7 @@
         </p:nvPicPr>
         <p:blipFill>
           <a:blip r:embed="rId4" cstate="print">
-            <a:extLst>
-              <a:ext uri="28A0092B-C50C-407e-A947-70E740481C1C">
-                <a14:useLocalDpi xmlns="" xmlns:a14="http://schemas.microsoft.com/office/drawing/2007/7/7/main" val="0"/>
-              </a:ext>
-            </a:extLst>
+            <a:extLst/>
           </a:blip>
           <a:srcRect/>
           <a:stretch>
@@ -5094,25 +5092,7 @@
             </a:camera>
             <a:lightRig rig="threePt" dir="t"/>
           </a:scene3d>
-          <a:extLst>
-            <a:ext uri="{909E8E84-426E-40dd-AFC4-6F175D3DCCD1}">
-              <a14:hiddenFill xmlns="" xmlns:a14="http://schemas.microsoft.com/office/drawing/2007/7/7/main">
-                <a:solidFill>
-                  <a:schemeClr val="accent1"/>
-                </a:solidFill>
-              </a14:hiddenFill>
-            </a:ext>
-            <a:ext uri="{91240B29-F687-4f45-9708-019B960494DF}">
-              <a14:hiddenLine xmlns="" xmlns:a14="http://schemas.microsoft.com/office/drawing/2007/7/7/main" w="9525">
-                <a:solidFill>
-                  <a:schemeClr val="tx1"/>
-                </a:solidFill>
-                <a:miter lim="800000"/>
-                <a:headEnd/>
-                <a:tailEnd/>
-              </a14:hiddenLine>
-            </a:ext>
-          </a:extLst>
+          <a:extLst/>
         </p:spPr>
       </p:pic>
       <p:pic>
@@ -5125,11 +5105,7 @@
         </p:nvPicPr>
         <p:blipFill>
           <a:blip r:embed="rId5" cstate="print">
-            <a:extLst>
-              <a:ext uri="28A0092B-C50C-407e-A947-70E740481C1C">
-                <a14:useLocalDpi xmlns="" xmlns:a14="http://schemas.microsoft.com/office/drawing/2007/7/7/main" val="0"/>
-              </a:ext>
-            </a:extLst>
+            <a:extLst/>
           </a:blip>
           <a:srcRect/>
           <a:stretch>
@@ -5150,34 +5126,7 @@
             </a:camera>
             <a:lightRig rig="threePt" dir="t"/>
           </a:scene3d>
-          <a:extLst>
-            <a:ext uri="{909E8E84-426E-40dd-AFC4-6F175D3DCCD1}">
-              <a14:hiddenFill xmlns="" xmlns:a14="http://schemas.microsoft.com/office/drawing/2007/7/7/main">
-                <a:solidFill>
-                  <a:schemeClr val="accent1"/>
-                </a:solidFill>
-              </a14:hiddenFill>
-            </a:ext>
-            <a:ext uri="{91240B29-F687-4f45-9708-019B960494DF}">
-              <a14:hiddenLine xmlns="" xmlns:a14="http://schemas.microsoft.com/office/drawing/2007/7/7/main" w="9525">
-                <a:solidFill>
-                  <a:schemeClr val="tx1"/>
-                </a:solidFill>
-                <a:miter lim="800000"/>
-                <a:headEnd/>
-                <a:tailEnd/>
-              </a14:hiddenLine>
-            </a:ext>
-            <a:ext uri="{AF507438-7753-43e0-B8FC-AC1667EBCBE1}">
-              <a14:hiddenEffects xmlns="" xmlns:a14="http://schemas.microsoft.com/office/drawing/2007/7/7/main">
-                <a:effectLst>
-                  <a:outerShdw blurRad="63500" dist="35921" dir="2700000" algn="ctr" rotWithShape="0">
-                    <a:schemeClr val="bg2"/>
-                  </a:outerShdw>
-                </a:effectLst>
-              </a14:hiddenEffects>
-            </a:ext>
-          </a:extLst>
+          <a:extLst/>
         </p:spPr>
       </p:pic>
       <p:sp>
@@ -5205,11 +5154,7 @@
         </p:txBody>
       </p:sp>
     </p:spTree>
-    <p:extLst>
-      <p:ext uri="{BB962C8B-B14F-4D97-AF65-F5344CB8AC3E}">
-        <p14:creationId xmlns="" xmlns:p14="http://schemas.microsoft.com/office/powerpoint/2007/7/12/main" val="3972523038"/>
-      </p:ext>
-    </p:extLst>
+    <p:extLst/>
   </p:cSld>
   <p:clrMapOvr>
     <a:masterClrMapping/>
@@ -5772,11 +5717,7 @@
         </p:txBody>
       </p:sp>
     </p:spTree>
-    <p:extLst>
-      <p:ext uri="{BB962C8B-B14F-4D97-AF65-F5344CB8AC3E}">
-        <p14:creationId xmlns="" xmlns:p14="http://schemas.microsoft.com/office/powerpoint/2007/7/12/main" val="2970969822"/>
-      </p:ext>
-    </p:extLst>
+    <p:extLst/>
   </p:cSld>
   <p:clrMapOvr>
     <a:masterClrMapping/>
@@ -6572,11 +6513,7 @@
           <a:p>
             <a:r>
               <a:rPr lang="en-US" dirty="0" smtClean="0"/>
-              <a:t>Variation </a:t>
-            </a:r>
-            <a:r>
-              <a:rPr lang="en-US" dirty="0" smtClean="0"/>
-              <a:t>Generation API</a:t>
+              <a:t>Variation Generation API</a:t>
             </a:r>
             <a:endParaRPr lang="en-US" dirty="0"/>
           </a:p>
@@ -6657,31 +6594,7 @@
                 <a:ea typeface="Calibri" pitchFamily="34" charset="0"/>
                 <a:cs typeface="Times New Roman" pitchFamily="18" charset="0"/>
               </a:rPr>
-              <a:t>("</a:t>
-            </a:r>
-            <a:r>
-              <a:rPr lang="en-US" sz="1400" dirty="0" smtClean="0">
-                <a:latin typeface="Consolas" pitchFamily="49" charset="0"/>
-                <a:ea typeface="Calibri" pitchFamily="34" charset="0"/>
-                <a:cs typeface="Times New Roman" pitchFamily="18" charset="0"/>
-              </a:rPr>
-              <a:t>Destination") { "Whistler", </a:t>
-            </a:r>
-            <a:r>
-              <a:rPr lang="en-US" sz="1400" dirty="0" smtClean="0">
-                <a:latin typeface="Consolas" pitchFamily="49" charset="0"/>
-                <a:ea typeface="Calibri" pitchFamily="34" charset="0"/>
-                <a:cs typeface="Times New Roman" pitchFamily="18" charset="0"/>
-              </a:rPr>
-              <a:t>"</a:t>
-            </a:r>
-            <a:r>
-              <a:rPr lang="en-US" sz="1400" dirty="0" smtClean="0">
-                <a:latin typeface="Consolas" pitchFamily="49" charset="0"/>
-                <a:ea typeface="Calibri" pitchFamily="34" charset="0"/>
-                <a:cs typeface="Times New Roman" pitchFamily="18" charset="0"/>
-              </a:rPr>
-              <a:t>Las Vegas" };</a:t>
+              <a:t>("Destination") { "Whistler", "Las Vegas" };</a:t>
             </a:r>
           </a:p>
           <a:p>
@@ -6723,7 +6636,15 @@
                 <a:ea typeface="Calibri" pitchFamily="34" charset="0"/>
                 <a:cs typeface="Times New Roman" pitchFamily="18" charset="0"/>
               </a:rPr>
-              <a:t> = new </a:t>
+              <a:t> = new Parameter&lt;</a:t>
+            </a:r>
+            <a:r>
+              <a:rPr lang="en-US" sz="1400" dirty="0" err="1" smtClean="0">
+                <a:latin typeface="Consolas" pitchFamily="49" charset="0"/>
+                <a:ea typeface="Calibri" pitchFamily="34" charset="0"/>
+                <a:cs typeface="Times New Roman" pitchFamily="18" charset="0"/>
+              </a:rPr>
+              <a:t>int</a:t>
             </a:r>
             <a:r>
               <a:rPr lang="en-US" sz="1400" dirty="0" smtClean="0">
@@ -6731,31 +6652,7 @@
                 <a:ea typeface="Calibri" pitchFamily="34" charset="0"/>
                 <a:cs typeface="Times New Roman" pitchFamily="18" charset="0"/>
               </a:rPr>
-              <a:t>Parameter&lt;</a:t>
-            </a:r>
-            <a:r>
-              <a:rPr lang="en-US" sz="1400" dirty="0" err="1" smtClean="0">
-                <a:latin typeface="Consolas" pitchFamily="49" charset="0"/>
-                <a:ea typeface="Calibri" pitchFamily="34" charset="0"/>
-                <a:cs typeface="Times New Roman" pitchFamily="18" charset="0"/>
-              </a:rPr>
-              <a:t>int</a:t>
-            </a:r>
-            <a:r>
-              <a:rPr lang="en-US" sz="1400" dirty="0" smtClean="0">
-                <a:latin typeface="Consolas" pitchFamily="49" charset="0"/>
-                <a:ea typeface="Calibri" pitchFamily="34" charset="0"/>
-                <a:cs typeface="Times New Roman" pitchFamily="18" charset="0"/>
-              </a:rPr>
-              <a:t>&gt;("</a:t>
-            </a:r>
-            <a:r>
-              <a:rPr lang="en-US" sz="1400" dirty="0" smtClean="0">
-                <a:latin typeface="Consolas" pitchFamily="49" charset="0"/>
-                <a:ea typeface="Calibri" pitchFamily="34" charset="0"/>
-                <a:cs typeface="Times New Roman" pitchFamily="18" charset="0"/>
-              </a:rPr>
-              <a:t>Hotel Quality") { 5, 4, 3, 2, 1 }; </a:t>
+              <a:t>&gt;("Hotel Quality") { 5, 4, 3, 2, 1 }; </a:t>
             </a:r>
           </a:p>
           <a:p>
@@ -6781,23 +6678,7 @@
                 <a:ea typeface="Calibri" pitchFamily="34" charset="0"/>
                 <a:cs typeface="Times New Roman" pitchFamily="18" charset="0"/>
               </a:rPr>
-              <a:t> activity = new </a:t>
-            </a:r>
-            <a:r>
-              <a:rPr lang="en-US" sz="1400" dirty="0" smtClean="0">
-                <a:latin typeface="Consolas" pitchFamily="49" charset="0"/>
-                <a:ea typeface="Calibri" pitchFamily="34" charset="0"/>
-                <a:cs typeface="Times New Roman" pitchFamily="18" charset="0"/>
-              </a:rPr>
-              <a:t>Parameter&lt;string&gt;("</a:t>
-            </a:r>
-            <a:r>
-              <a:rPr lang="en-US" sz="1400" dirty="0" smtClean="0">
-                <a:latin typeface="Consolas" pitchFamily="49" charset="0"/>
-                <a:ea typeface="Calibri" pitchFamily="34" charset="0"/>
-                <a:cs typeface="Times New Roman" pitchFamily="18" charset="0"/>
-              </a:rPr>
-              <a:t>Activity") { "gambling", "swimming", "skiing" };</a:t>
+              <a:t> activity = new Parameter&lt;string&gt;("Activity") { "gambling", "swimming", "skiing" };</a:t>
             </a:r>
           </a:p>
           <a:p>
@@ -6838,7 +6719,15 @@
                 <a:ea typeface="Calibri" pitchFamily="34" charset="0"/>
                 <a:cs typeface="Times New Roman" pitchFamily="18" charset="0"/>
               </a:rPr>
-              <a:t> parameters = new </a:t>
+              <a:t> parameters = new List&lt;</a:t>
+            </a:r>
+            <a:r>
+              <a:rPr lang="en-US" sz="1400" dirty="0" err="1" smtClean="0">
+                <a:latin typeface="Consolas" pitchFamily="49" charset="0"/>
+                <a:ea typeface="Calibri" pitchFamily="34" charset="0"/>
+                <a:cs typeface="Times New Roman" pitchFamily="18" charset="0"/>
+              </a:rPr>
+              <a:t>ParameterBase</a:t>
             </a:r>
             <a:r>
               <a:rPr lang="en-US" sz="1400" dirty="0" smtClean="0">
@@ -6846,31 +6735,7 @@
                 <a:ea typeface="Calibri" pitchFamily="34" charset="0"/>
                 <a:cs typeface="Times New Roman" pitchFamily="18" charset="0"/>
               </a:rPr>
-              <a:t>List&lt;</a:t>
-            </a:r>
-            <a:r>
-              <a:rPr lang="en-US" sz="1400" dirty="0" err="1" smtClean="0">
-                <a:latin typeface="Consolas" pitchFamily="49" charset="0"/>
-                <a:ea typeface="Calibri" pitchFamily="34" charset="0"/>
-                <a:cs typeface="Times New Roman" pitchFamily="18" charset="0"/>
-              </a:rPr>
-              <a:t>ParameterBase</a:t>
-            </a:r>
-            <a:r>
-              <a:rPr lang="en-US" sz="1400" dirty="0" smtClean="0">
-                <a:latin typeface="Consolas" pitchFamily="49" charset="0"/>
-                <a:ea typeface="Calibri" pitchFamily="34" charset="0"/>
-                <a:cs typeface="Times New Roman" pitchFamily="18" charset="0"/>
-              </a:rPr>
-              <a:t>&gt; </a:t>
-            </a:r>
-            <a:r>
-              <a:rPr lang="en-US" sz="1400" dirty="0" smtClean="0">
-                <a:latin typeface="Consolas" pitchFamily="49" charset="0"/>
-                <a:ea typeface="Calibri" pitchFamily="34" charset="0"/>
-                <a:cs typeface="Times New Roman" pitchFamily="18" charset="0"/>
-              </a:rPr>
-              <a:t>{ destination, </a:t>
+              <a:t>&gt; { destination, </a:t>
             </a:r>
             <a:r>
               <a:rPr lang="en-US" sz="1400" dirty="0" err="1" smtClean="0">
@@ -6912,15 +6777,7 @@
                 <a:ea typeface="Calibri" pitchFamily="34" charset="0"/>
                 <a:cs typeface="Times New Roman" pitchFamily="18" charset="0"/>
               </a:rPr>
-              <a:t> constraints = new </a:t>
-            </a:r>
-            <a:r>
-              <a:rPr lang="en-US" sz="1400" dirty="0" smtClean="0">
-                <a:latin typeface="Consolas" pitchFamily="49" charset="0"/>
-                <a:ea typeface="Calibri" pitchFamily="34" charset="0"/>
-                <a:cs typeface="Times New Roman" pitchFamily="18" charset="0"/>
-              </a:rPr>
-              <a:t>List&lt;</a:t>
+              <a:t> constraints = new List&lt;</a:t>
             </a:r>
             <a:r>
               <a:rPr lang="en-US" sz="1400" b="1" dirty="0" smtClean="0">
@@ -6941,11 +6798,6 @@
               </a:rPr>
               <a:t>&gt;</a:t>
             </a:r>
-            <a:endParaRPr lang="en-US" sz="1400" dirty="0" smtClean="0">
-              <a:latin typeface="Consolas" pitchFamily="49" charset="0"/>
-              <a:ea typeface="Calibri" pitchFamily="34" charset="0"/>
-              <a:cs typeface="Times New Roman" pitchFamily="18" charset="0"/>
-            </a:endParaRPr>
           </a:p>
           <a:p>
             <a:pPr lvl="0" fontAlgn="base">
@@ -6980,15 +6832,7 @@
                 <a:ea typeface="Calibri" pitchFamily="34" charset="0"/>
                 <a:cs typeface="Times New Roman" pitchFamily="18" charset="0"/>
               </a:rPr>
-              <a:t>    </a:t>
-            </a:r>
-            <a:r>
-              <a:rPr lang="en-US" sz="1400" dirty="0" smtClean="0">
-                <a:latin typeface="Consolas" pitchFamily="49" charset="0"/>
-                <a:ea typeface="Calibri" pitchFamily="34" charset="0"/>
-                <a:cs typeface="Times New Roman" pitchFamily="18" charset="0"/>
-              </a:rPr>
-              <a:t>Constraint&lt;Variation&gt;</a:t>
+              <a:t>    Constraint&lt;Variation&gt;</a:t>
             </a:r>
           </a:p>
           <a:p>
@@ -7006,7 +6850,15 @@
                 <a:ea typeface="Calibri" pitchFamily="34" charset="0"/>
                 <a:cs typeface="Times New Roman" pitchFamily="18" charset="0"/>
               </a:rPr>
-              <a:t> </a:t>
+              <a:t>        .If(v =&gt; </a:t>
+            </a:r>
+            <a:r>
+              <a:rPr lang="en-US" sz="1400" dirty="0" err="1" smtClean="0">
+                <a:latin typeface="Consolas" pitchFamily="49" charset="0"/>
+                <a:ea typeface="Calibri" pitchFamily="34" charset="0"/>
+                <a:cs typeface="Times New Roman" pitchFamily="18" charset="0"/>
+              </a:rPr>
+              <a:t>destination.GetValue</a:t>
             </a:r>
             <a:r>
               <a:rPr lang="en-US" sz="1400" dirty="0" smtClean="0">
@@ -7014,47 +6866,7 @@
                 <a:ea typeface="Calibri" pitchFamily="34" charset="0"/>
                 <a:cs typeface="Times New Roman" pitchFamily="18" charset="0"/>
               </a:rPr>
-              <a:t>       .</a:t>
-            </a:r>
-            <a:r>
-              <a:rPr lang="en-US" sz="1400" dirty="0" smtClean="0">
-                <a:latin typeface="Consolas" pitchFamily="49" charset="0"/>
-                <a:ea typeface="Calibri" pitchFamily="34" charset="0"/>
-                <a:cs typeface="Times New Roman" pitchFamily="18" charset="0"/>
-              </a:rPr>
-              <a:t>If(v =&gt; </a:t>
-            </a:r>
-            <a:r>
-              <a:rPr lang="en-US" sz="1400" dirty="0" err="1" smtClean="0">
-                <a:latin typeface="Consolas" pitchFamily="49" charset="0"/>
-                <a:ea typeface="Calibri" pitchFamily="34" charset="0"/>
-                <a:cs typeface="Times New Roman" pitchFamily="18" charset="0"/>
-              </a:rPr>
-              <a:t>destination.GetValue</a:t>
-            </a:r>
-            <a:r>
-              <a:rPr lang="en-US" sz="1400" dirty="0" smtClean="0">
-                <a:latin typeface="Consolas" pitchFamily="49" charset="0"/>
-                <a:ea typeface="Calibri" pitchFamily="34" charset="0"/>
-                <a:cs typeface="Times New Roman" pitchFamily="18" charset="0"/>
-              </a:rPr>
-              <a:t>(v</a:t>
-            </a:r>
-            <a:r>
-              <a:rPr lang="en-US" sz="1400" dirty="0" smtClean="0">
-                <a:latin typeface="Consolas" pitchFamily="49" charset="0"/>
-                <a:ea typeface="Calibri" pitchFamily="34" charset="0"/>
-                <a:cs typeface="Times New Roman" pitchFamily="18" charset="0"/>
-              </a:rPr>
-              <a:t>) == "Las </a:t>
-            </a:r>
-            <a:r>
-              <a:rPr lang="en-US" sz="1400" dirty="0" smtClean="0">
-                <a:latin typeface="Consolas" pitchFamily="49" charset="0"/>
-                <a:ea typeface="Calibri" pitchFamily="34" charset="0"/>
-                <a:cs typeface="Times New Roman" pitchFamily="18" charset="0"/>
-              </a:rPr>
-              <a:t>Vegas")</a:t>
+              <a:t>(v) == "Las Vegas")</a:t>
             </a:r>
           </a:p>
           <a:p>
@@ -7072,7 +6884,15 @@
                 <a:ea typeface="Calibri" pitchFamily="34" charset="0"/>
                 <a:cs typeface="Times New Roman" pitchFamily="18" charset="0"/>
               </a:rPr>
-              <a:t> </a:t>
+              <a:t>        .Then(v =&gt; </a:t>
+            </a:r>
+            <a:r>
+              <a:rPr lang="en-US" sz="1400" dirty="0" err="1" smtClean="0">
+                <a:latin typeface="Consolas" pitchFamily="49" charset="0"/>
+                <a:ea typeface="Calibri" pitchFamily="34" charset="0"/>
+                <a:cs typeface="Times New Roman" pitchFamily="18" charset="0"/>
+              </a:rPr>
+              <a:t>activity.GetValue</a:t>
             </a:r>
             <a:r>
               <a:rPr lang="en-US" sz="1400" dirty="0" smtClean="0">
@@ -7080,31 +6900,7 @@
                 <a:ea typeface="Calibri" pitchFamily="34" charset="0"/>
                 <a:cs typeface="Times New Roman" pitchFamily="18" charset="0"/>
               </a:rPr>
-              <a:t>       .Then(v =&gt; </a:t>
-            </a:r>
-            <a:r>
-              <a:rPr lang="en-US" sz="1400" dirty="0" err="1" smtClean="0">
-                <a:latin typeface="Consolas" pitchFamily="49" charset="0"/>
-                <a:ea typeface="Calibri" pitchFamily="34" charset="0"/>
-                <a:cs typeface="Times New Roman" pitchFamily="18" charset="0"/>
-              </a:rPr>
-              <a:t>activity.GetValue</a:t>
-            </a:r>
-            <a:r>
-              <a:rPr lang="en-US" sz="1400" dirty="0" smtClean="0">
-                <a:latin typeface="Consolas" pitchFamily="49" charset="0"/>
-                <a:ea typeface="Calibri" pitchFamily="34" charset="0"/>
-                <a:cs typeface="Times New Roman" pitchFamily="18" charset="0"/>
-              </a:rPr>
-              <a:t>(v) != "skiing</a:t>
-            </a:r>
-            <a:r>
-              <a:rPr lang="en-US" sz="1400" dirty="0" smtClean="0">
-                <a:latin typeface="Consolas" pitchFamily="49" charset="0"/>
-                <a:ea typeface="Calibri" pitchFamily="34" charset="0"/>
-                <a:cs typeface="Times New Roman" pitchFamily="18" charset="0"/>
-              </a:rPr>
-              <a:t>"),</a:t>
+              <a:t>(v) != "skiing"),</a:t>
             </a:r>
           </a:p>
           <a:p>
@@ -7124,11 +6920,6 @@
               </a:rPr>
               <a:t>    ...</a:t>
             </a:r>
-            <a:endParaRPr lang="en-US" sz="1400" dirty="0" smtClean="0">
-              <a:latin typeface="Consolas" pitchFamily="49" charset="0"/>
-              <a:ea typeface="Calibri" pitchFamily="34" charset="0"/>
-              <a:cs typeface="Times New Roman" pitchFamily="18" charset="0"/>
-            </a:endParaRPr>
           </a:p>
           <a:p>
             <a:pPr lvl="0" fontAlgn="base">
@@ -7246,15 +7037,7 @@
                 <a:ea typeface="Calibri" pitchFamily="34" charset="0"/>
                 <a:cs typeface="Times New Roman" pitchFamily="18" charset="0"/>
               </a:rPr>
-              <a:t> </a:t>
-            </a:r>
-            <a:r>
-              <a:rPr lang="en-US" sz="1400" dirty="0" smtClean="0">
-                <a:latin typeface="Consolas" pitchFamily="49" charset="0"/>
-                <a:ea typeface="Calibri" pitchFamily="34" charset="0"/>
-                <a:cs typeface="Times New Roman" pitchFamily="18" charset="0"/>
-              </a:rPr>
-              <a:t>(</a:t>
+              <a:t> (</a:t>
             </a:r>
             <a:r>
               <a:rPr lang="en-US" sz="1400" b="1" dirty="0" err="1" smtClean="0">
@@ -7284,15 +7067,7 @@
                 <a:ea typeface="Calibri" pitchFamily="34" charset="0"/>
                 <a:cs typeface="Times New Roman" pitchFamily="18" charset="0"/>
               </a:rPr>
-              <a:t>v </a:t>
-            </a:r>
-            <a:r>
-              <a:rPr lang="en-US" sz="1400" dirty="0" smtClean="0">
-                <a:latin typeface="Consolas" pitchFamily="49" charset="0"/>
-                <a:ea typeface="Calibri" pitchFamily="34" charset="0"/>
-                <a:cs typeface="Times New Roman" pitchFamily="18" charset="0"/>
-              </a:rPr>
-              <a:t>in </a:t>
+              <a:t>v in </a:t>
             </a:r>
             <a:r>
               <a:rPr lang="en-US" sz="1400" dirty="0" err="1" smtClean="0">
@@ -7378,53 +7153,8 @@
                 <a:ea typeface="Calibri" pitchFamily="34" charset="0"/>
                 <a:cs typeface="Times New Roman" pitchFamily="18" charset="0"/>
               </a:rPr>
-              <a:t>        v</a:t>
-            </a:r>
-            <a:r>
-              <a:rPr lang="en-US" sz="1400" dirty="0" smtClean="0">
-                <a:latin typeface="Consolas" pitchFamily="49" charset="0"/>
-                <a:ea typeface="Calibri" pitchFamily="34" charset="0"/>
-                <a:cs typeface="Times New Roman" pitchFamily="18" charset="0"/>
-              </a:rPr>
-              <a:t>["Destination"], </a:t>
-            </a:r>
-            <a:r>
-              <a:rPr lang="en-US" sz="1400" dirty="0" smtClean="0">
-                <a:latin typeface="Consolas" pitchFamily="49" charset="0"/>
-                <a:ea typeface="Calibri" pitchFamily="34" charset="0"/>
-                <a:cs typeface="Times New Roman" pitchFamily="18" charset="0"/>
-              </a:rPr>
-              <a:t>v</a:t>
-            </a:r>
-            <a:r>
-              <a:rPr lang="en-US" sz="1400" dirty="0" smtClean="0">
-                <a:latin typeface="Consolas" pitchFamily="49" charset="0"/>
-                <a:ea typeface="Calibri" pitchFamily="34" charset="0"/>
-                <a:cs typeface="Times New Roman" pitchFamily="18" charset="0"/>
-              </a:rPr>
-              <a:t>["Hotel Quality"], </a:t>
-            </a:r>
-            <a:r>
-              <a:rPr lang="en-US" sz="1400" dirty="0" smtClean="0">
-                <a:latin typeface="Consolas" pitchFamily="49" charset="0"/>
-                <a:ea typeface="Calibri" pitchFamily="34" charset="0"/>
-                <a:cs typeface="Times New Roman" pitchFamily="18" charset="0"/>
-              </a:rPr>
-              <a:t>v</a:t>
-            </a:r>
-            <a:r>
-              <a:rPr lang="en-US" sz="1400" dirty="0" smtClean="0">
-                <a:latin typeface="Consolas" pitchFamily="49" charset="0"/>
-                <a:ea typeface="Calibri" pitchFamily="34" charset="0"/>
-                <a:cs typeface="Times New Roman" pitchFamily="18" charset="0"/>
-              </a:rPr>
-              <a:t>["Activity"]);</a:t>
-            </a:r>
-            <a:endParaRPr lang="en-US" sz="1400" dirty="0" smtClean="0">
-              <a:latin typeface="Consolas" pitchFamily="49" charset="0"/>
-              <a:ea typeface="Calibri" pitchFamily="34" charset="0"/>
-              <a:cs typeface="Times New Roman" pitchFamily="18" charset="0"/>
-            </a:endParaRPr>
+              <a:t>        v["Destination"], v["Hotel Quality"], v["Activity"]);</a:t>
+            </a:r>
           </a:p>
           <a:p>
             <a:pPr lvl="0" fontAlgn="base">
@@ -7936,15 +7666,7 @@
                 <a:ea typeface="Calibri" pitchFamily="34" charset="0"/>
                 <a:cs typeface="Times New Roman" pitchFamily="18" charset="0"/>
               </a:rPr>
-              <a:t>v</a:t>
-            </a:r>
-            <a:r>
-              <a:rPr lang="en-US" dirty="0" err="1" smtClean="0">
-                <a:latin typeface="Consolas" pitchFamily="49" charset="0"/>
-                <a:ea typeface="Calibri" pitchFamily="34" charset="0"/>
-                <a:cs typeface="Times New Roman" pitchFamily="18" charset="0"/>
-              </a:rPr>
-              <a:t>ar</a:t>
+              <a:t>var</a:t>
             </a:r>
             <a:r>
               <a:rPr lang="en-US" dirty="0" smtClean="0">
@@ -7952,15 +7674,7 @@
                 <a:ea typeface="Calibri" pitchFamily="34" charset="0"/>
                 <a:cs typeface="Times New Roman" pitchFamily="18" charset="0"/>
               </a:rPr>
-              <a:t> destination </a:t>
-            </a:r>
-            <a:r>
-              <a:rPr lang="en-US" dirty="0" smtClean="0">
-                <a:latin typeface="Consolas" pitchFamily="49" charset="0"/>
-                <a:ea typeface="Calibri" pitchFamily="34" charset="0"/>
-                <a:cs typeface="Times New Roman" pitchFamily="18" charset="0"/>
-              </a:rPr>
-              <a:t>= </a:t>
+              <a:t> destination = </a:t>
             </a:r>
           </a:p>
           <a:p>
@@ -8106,23 +7820,7 @@
                 <a:ea typeface="Calibri" pitchFamily="34" charset="0"/>
                 <a:cs typeface="Times New Roman" pitchFamily="18" charset="0"/>
               </a:rPr>
-              <a:t>&lt;string</a:t>
-            </a:r>
-            <a:r>
-              <a:rPr lang="en-US" dirty="0" smtClean="0">
-                <a:latin typeface="Consolas" pitchFamily="49" charset="0"/>
-                <a:ea typeface="Calibri" pitchFamily="34" charset="0"/>
-                <a:cs typeface="Times New Roman" pitchFamily="18" charset="0"/>
-              </a:rPr>
-              <a:t>&gt;("</a:t>
-            </a:r>
-            <a:r>
-              <a:rPr lang="en-US" dirty="0" smtClean="0">
-                <a:latin typeface="Consolas" pitchFamily="49" charset="0"/>
-                <a:ea typeface="Calibri" pitchFamily="34" charset="0"/>
-                <a:cs typeface="Times New Roman" pitchFamily="18" charset="0"/>
-              </a:rPr>
-              <a:t>Cleveland", </a:t>
+              <a:t>&lt;string&gt;("Cleveland", </a:t>
             </a:r>
             <a:r>
               <a:rPr lang="en-US" b="1" dirty="0" smtClean="0">
@@ -8237,7 +7935,15 @@
                 <a:ea typeface="Calibri" pitchFamily="34" charset="0"/>
                 <a:cs typeface="Times New Roman" pitchFamily="18" charset="0"/>
               </a:rPr>
-              <a:t> </a:t>
+              <a:t> (</a:t>
+            </a:r>
+            <a:r>
+              <a:rPr lang="en-US" dirty="0" err="1" smtClean="0">
+                <a:latin typeface="Consolas" pitchFamily="49" charset="0"/>
+                <a:ea typeface="Calibri" pitchFamily="34" charset="0"/>
+                <a:cs typeface="Times New Roman" pitchFamily="18" charset="0"/>
+              </a:rPr>
+              <a:t>var</a:t>
             </a:r>
             <a:r>
               <a:rPr lang="en-US" dirty="0" smtClean="0">
@@ -8245,31 +7951,7 @@
                 <a:ea typeface="Calibri" pitchFamily="34" charset="0"/>
                 <a:cs typeface="Times New Roman" pitchFamily="18" charset="0"/>
               </a:rPr>
-              <a:t>(</a:t>
-            </a:r>
-            <a:r>
-              <a:rPr lang="en-US" dirty="0" err="1" smtClean="0">
-                <a:latin typeface="Consolas" pitchFamily="49" charset="0"/>
-                <a:ea typeface="Calibri" pitchFamily="34" charset="0"/>
-                <a:cs typeface="Times New Roman" pitchFamily="18" charset="0"/>
-              </a:rPr>
-              <a:t>var</a:t>
-            </a:r>
-            <a:r>
-              <a:rPr lang="en-US" dirty="0" smtClean="0">
-                <a:latin typeface="Consolas" pitchFamily="49" charset="0"/>
-                <a:ea typeface="Calibri" pitchFamily="34" charset="0"/>
-                <a:cs typeface="Times New Roman" pitchFamily="18" charset="0"/>
-              </a:rPr>
-              <a:t> v </a:t>
-            </a:r>
-            <a:r>
-              <a:rPr lang="en-US" dirty="0" smtClean="0">
-                <a:latin typeface="Consolas" pitchFamily="49" charset="0"/>
-                <a:ea typeface="Calibri" pitchFamily="34" charset="0"/>
-                <a:cs typeface="Times New Roman" pitchFamily="18" charset="0"/>
-              </a:rPr>
-              <a:t>in </a:t>
+              <a:t> v in </a:t>
             </a:r>
             <a:r>
               <a:rPr lang="en-US" dirty="0" err="1" smtClean="0">
@@ -8591,15 +8273,7 @@
                 <a:ea typeface="Calibri" pitchFamily="34" charset="0"/>
                 <a:cs typeface="Times New Roman" pitchFamily="18" charset="0"/>
               </a:rPr>
-              <a:t> </a:t>
-            </a:r>
-            <a:r>
-              <a:rPr lang="en-US" sz="1400" dirty="0" smtClean="0">
-                <a:latin typeface="Consolas" pitchFamily="49" charset="0"/>
-                <a:ea typeface="Calibri" pitchFamily="34" charset="0"/>
-                <a:cs typeface="Times New Roman" pitchFamily="18" charset="0"/>
-              </a:rPr>
-              <a:t>  </a:t>
+              <a:t>   </a:t>
             </a:r>
             <a:r>
               <a:rPr lang="en-US" sz="1400" b="1" dirty="0" smtClean="0">
@@ -8623,15 +8297,7 @@
                 <a:ea typeface="Calibri" pitchFamily="34" charset="0"/>
                 <a:cs typeface="Times New Roman" pitchFamily="18" charset="0"/>
               </a:rPr>
-              <a:t> </a:t>
-            </a:r>
-            <a:r>
-              <a:rPr lang="en-US" sz="1400" dirty="0" smtClean="0">
-                <a:latin typeface="Consolas" pitchFamily="49" charset="0"/>
-                <a:ea typeface="Calibri" pitchFamily="34" charset="0"/>
-                <a:cs typeface="Times New Roman" pitchFamily="18" charset="0"/>
-              </a:rPr>
-              <a:t>  public </a:t>
+              <a:t>   public </a:t>
             </a:r>
             <a:r>
               <a:rPr lang="en-US" sz="1400" dirty="0" err="1" smtClean="0">
@@ -8716,40 +8382,7 @@
                 <a:ea typeface="Calibri" pitchFamily="34" charset="0"/>
                 <a:cs typeface="Times New Roman" pitchFamily="18" charset="0"/>
               </a:rPr>
-              <a:t> </a:t>
-            </a:r>
-            <a:r>
-              <a:rPr lang="en-US" sz="1400" b="1" dirty="0" smtClean="0">
-                <a:solidFill>
-                  <a:schemeClr val="accent1"/>
-                </a:solidFill>
-                <a:latin typeface="Consolas" pitchFamily="49" charset="0"/>
-                <a:ea typeface="Calibri" pitchFamily="34" charset="0"/>
-                <a:cs typeface="Times New Roman" pitchFamily="18" charset="0"/>
-              </a:rPr>
-              <a:t>  [Parameter("</a:t>
-            </a:r>
-            <a:r>
-              <a:rPr lang="en-US" sz="1400" b="1" dirty="0" smtClean="0">
-                <a:solidFill>
-                  <a:schemeClr val="accent1"/>
-                </a:solidFill>
-                <a:latin typeface="Consolas" pitchFamily="49" charset="0"/>
-                <a:ea typeface="Calibri" pitchFamily="34" charset="0"/>
-                <a:cs typeface="Times New Roman" pitchFamily="18" charset="0"/>
-              </a:rPr>
-              <a:t>Vista", </a:t>
-            </a:r>
-            <a:r>
-              <a:rPr lang="en-US" sz="1400" b="1" dirty="0" smtClean="0">
-                <a:solidFill>
-                  <a:schemeClr val="accent1"/>
-                </a:solidFill>
-                <a:latin typeface="Consolas" pitchFamily="49" charset="0"/>
-                <a:ea typeface="Calibri" pitchFamily="34" charset="0"/>
-                <a:cs typeface="Times New Roman" pitchFamily="18" charset="0"/>
-              </a:rPr>
-              <a:t>"Win7", Weight = 3.0F)]</a:t>
+              <a:t>   [Parameter("Vista", "Win7", Weight = 3.0F)]</a:t>
             </a:r>
           </a:p>
           <a:p>
@@ -8762,23 +8395,7 @@
                 <a:ea typeface="Calibri" pitchFamily="34" charset="0"/>
                 <a:cs typeface="Times New Roman" pitchFamily="18" charset="0"/>
               </a:rPr>
-              <a:t>   public </a:t>
-            </a:r>
-            <a:r>
-              <a:rPr lang="en-US" sz="1400" dirty="0" smtClean="0">
-                <a:latin typeface="Consolas" pitchFamily="49" charset="0"/>
-                <a:ea typeface="Calibri" pitchFamily="34" charset="0"/>
-                <a:cs typeface="Times New Roman" pitchFamily="18" charset="0"/>
-              </a:rPr>
-              <a:t>string OS { get; set; </a:t>
-            </a:r>
-            <a:r>
-              <a:rPr lang="en-US" sz="1400" dirty="0" smtClean="0">
-                <a:latin typeface="Consolas" pitchFamily="49" charset="0"/>
-                <a:ea typeface="Calibri" pitchFamily="34" charset="0"/>
-                <a:cs typeface="Times New Roman" pitchFamily="18" charset="0"/>
-              </a:rPr>
-              <a:t>}</a:t>
+              <a:t>   public string OS { get; set; }</a:t>
             </a:r>
           </a:p>
           <a:p>
@@ -8942,7 +8559,15 @@
                 <a:ea typeface="Calibri" pitchFamily="34" charset="0"/>
                 <a:cs typeface="Times New Roman" pitchFamily="18" charset="0"/>
               </a:rPr>
-              <a:t> </a:t>
+              <a:t> (</a:t>
+            </a:r>
+            <a:r>
+              <a:rPr lang="en-US" sz="1400" dirty="0" err="1" smtClean="0">
+                <a:latin typeface="Consolas" pitchFamily="49" charset="0"/>
+                <a:ea typeface="Calibri" pitchFamily="34" charset="0"/>
+                <a:cs typeface="Times New Roman" pitchFamily="18" charset="0"/>
+              </a:rPr>
+              <a:t>OsConfiguration</a:t>
             </a:r>
             <a:r>
               <a:rPr lang="en-US" sz="1400" dirty="0" smtClean="0">
@@ -8950,31 +8575,7 @@
                 <a:ea typeface="Calibri" pitchFamily="34" charset="0"/>
                 <a:cs typeface="Times New Roman" pitchFamily="18" charset="0"/>
               </a:rPr>
-              <a:t>(</a:t>
-            </a:r>
-            <a:r>
-              <a:rPr lang="en-US" sz="1400" dirty="0" err="1" smtClean="0">
-                <a:latin typeface="Consolas" pitchFamily="49" charset="0"/>
-                <a:ea typeface="Calibri" pitchFamily="34" charset="0"/>
-                <a:cs typeface="Times New Roman" pitchFamily="18" charset="0"/>
-              </a:rPr>
-              <a:t>OsConfiguration</a:t>
-            </a:r>
-            <a:r>
-              <a:rPr lang="en-US" sz="1400" dirty="0" smtClean="0">
-                <a:latin typeface="Consolas" pitchFamily="49" charset="0"/>
-                <a:ea typeface="Calibri" pitchFamily="34" charset="0"/>
-                <a:cs typeface="Times New Roman" pitchFamily="18" charset="0"/>
-              </a:rPr>
-              <a:t> </a:t>
-            </a:r>
-            <a:r>
-              <a:rPr lang="en-US" sz="1400" dirty="0" smtClean="0">
-                <a:latin typeface="Consolas" pitchFamily="49" charset="0"/>
-                <a:ea typeface="Calibri" pitchFamily="34" charset="0"/>
-                <a:cs typeface="Times New Roman" pitchFamily="18" charset="0"/>
-              </a:rPr>
-              <a:t>c in </a:t>
+              <a:t> c in </a:t>
             </a:r>
             <a:r>
               <a:rPr lang="en-US" sz="1400" dirty="0" err="1" smtClean="0">
@@ -9005,11 +8606,6 @@
               </a:rPr>
               <a:t>   {</a:t>
             </a:r>
-            <a:endParaRPr lang="en-US" sz="1400" dirty="0" smtClean="0">
-              <a:latin typeface="Consolas" pitchFamily="49" charset="0"/>
-              <a:ea typeface="Calibri" pitchFamily="34" charset="0"/>
-              <a:cs typeface="Times New Roman" pitchFamily="18" charset="0"/>
-            </a:endParaRPr>
           </a:p>
           <a:p>
             <a:pPr>
@@ -9050,37 +8646,8 @@
                 <a:ea typeface="Calibri" pitchFamily="34" charset="0"/>
                 <a:cs typeface="Times New Roman" pitchFamily="18" charset="0"/>
               </a:rPr>
-              <a:t> </a:t>
-            </a:r>
-            <a:r>
-              <a:rPr lang="en-US" sz="1400" dirty="0" smtClean="0">
-                <a:latin typeface="Consolas" pitchFamily="49" charset="0"/>
-                <a:ea typeface="Calibri" pitchFamily="34" charset="0"/>
-                <a:cs typeface="Times New Roman" pitchFamily="18" charset="0"/>
-              </a:rPr>
-              <a:t>        "{</a:t>
-            </a:r>
-            <a:r>
-              <a:rPr lang="en-US" sz="1400" dirty="0" smtClean="0">
-                <a:latin typeface="Consolas" pitchFamily="49" charset="0"/>
-                <a:ea typeface="Calibri" pitchFamily="34" charset="0"/>
-                <a:cs typeface="Times New Roman" pitchFamily="18" charset="0"/>
-              </a:rPr>
-              <a:t>0} {1</a:t>
-            </a:r>
-            <a:r>
-              <a:rPr lang="en-US" sz="1400" dirty="0" smtClean="0">
-                <a:latin typeface="Consolas" pitchFamily="49" charset="0"/>
-                <a:ea typeface="Calibri" pitchFamily="34" charset="0"/>
-                <a:cs typeface="Times New Roman" pitchFamily="18" charset="0"/>
-              </a:rPr>
-              <a:t>}", </a:t>
-            </a:r>
-            <a:endParaRPr lang="en-US" sz="1400" dirty="0" smtClean="0">
-              <a:latin typeface="Consolas" pitchFamily="49" charset="0"/>
-              <a:ea typeface="Calibri" pitchFamily="34" charset="0"/>
-              <a:cs typeface="Times New Roman" pitchFamily="18" charset="0"/>
-            </a:endParaRPr>
+              <a:t>         "{0} {1}", </a:t>
+            </a:r>
           </a:p>
           <a:p>
             <a:pPr>
@@ -9152,11 +8719,6 @@
               </a:rPr>
               <a:t>}</a:t>
             </a:r>
-            <a:endParaRPr lang="en-US" sz="1400" dirty="0" smtClean="0">
-              <a:latin typeface="Consolas" pitchFamily="49" charset="0"/>
-              <a:ea typeface="Calibri" pitchFamily="34" charset="0"/>
-              <a:cs typeface="Times New Roman" pitchFamily="18" charset="0"/>
-            </a:endParaRPr>
           </a:p>
         </p:txBody>
       </p:sp>
@@ -9233,7 +8795,6 @@
               <a:rPr lang="en-US" sz="1600" dirty="0" smtClean="0"/>
               <a:t>. </a:t>
             </a:r>
-            <a:endParaRPr lang="en-US" sz="1600" dirty="0" smtClean="0"/>
           </a:p>
         </p:txBody>
       </p:sp>
@@ -9286,7 +8847,6 @@
               <a:rPr lang="en-US" sz="1600" dirty="0" smtClean="0"/>
               <a:t> too.</a:t>
             </a:r>
-            <a:endParaRPr lang="en-US" sz="1600" dirty="0" smtClean="0"/>
           </a:p>
         </p:txBody>
       </p:sp>
@@ -9449,15 +9009,7 @@
                 <a:ea typeface="Calibri" pitchFamily="34" charset="0"/>
                 <a:cs typeface="Times New Roman" pitchFamily="18" charset="0"/>
               </a:rPr>
-              <a:t>("Injected</a:t>
-            </a:r>
-            <a:r>
-              <a:rPr lang="en-US" dirty="0" smtClean="0">
-                <a:latin typeface="Consolas" pitchFamily="49" charset="0"/>
-                <a:ea typeface="Calibri" pitchFamily="34" charset="0"/>
-                <a:cs typeface="Times New Roman" pitchFamily="18" charset="0"/>
-              </a:rPr>
-              <a:t>!"));</a:t>
+              <a:t>("Injected!"));</a:t>
             </a:r>
           </a:p>
           <a:p>
@@ -10509,21 +10061,8 @@
                 <a:ea typeface="Calibri" pitchFamily="34" charset="0"/>
                 <a:cs typeface="Times New Roman" pitchFamily="18" charset="0"/>
               </a:rPr>
-              <a:t>(0x0400, 0x04FF</a:t>
-            </a:r>
-            <a:r>
-              <a:rPr lang="en-US" dirty="0" smtClean="0">
-                <a:latin typeface="Consolas" pitchFamily="49" charset="0"/>
-                <a:ea typeface="Calibri" pitchFamily="34" charset="0"/>
-                <a:cs typeface="Times New Roman" pitchFamily="18" charset="0"/>
-              </a:rPr>
-              <a:t>));</a:t>
-            </a:r>
-            <a:endParaRPr lang="en-US" dirty="0" smtClean="0">
-              <a:latin typeface="Consolas" pitchFamily="49" charset="0"/>
-              <a:ea typeface="Calibri" pitchFamily="34" charset="0"/>
-              <a:cs typeface="Times New Roman" pitchFamily="18" charset="0"/>
-            </a:endParaRPr>
+              <a:t>(0x0400, 0x04FF));</a:t>
+            </a:r>
           </a:p>
           <a:p>
             <a:r>
@@ -10864,7 +10403,7 @@
         <p:spPr>
           <a:xfrm>
             <a:off x="609600" y="1502689"/>
-            <a:ext cx="8153400" cy="4462760"/>
+            <a:ext cx="8153400" cy="5016758"/>
           </a:xfrm>
           <a:prstGeom prst="rect">
             <a:avLst/>
@@ -10930,54 +10469,40 @@
                 </a:solidFill>
                 <a:latin typeface="Consolas" pitchFamily="49" charset="0"/>
               </a:rPr>
-              <a:t>ObjectComparer</a:t>
+              <a:t>ObjectGraphComparer</a:t>
             </a:r>
             <a:r>
               <a:rPr lang="en-US" dirty="0" smtClean="0">
                 <a:latin typeface="Consolas" pitchFamily="49" charset="0"/>
               </a:rPr>
-              <a:t> c = new </a:t>
+              <a:t> </a:t>
+            </a:r>
+            <a:r>
+              <a:rPr lang="en-US" dirty="0" smtClean="0">
+                <a:latin typeface="Consolas" pitchFamily="49" charset="0"/>
+              </a:rPr>
+              <a:t>c = new </a:t>
             </a:r>
             <a:r>
               <a:rPr lang="en-US" dirty="0" err="1" smtClean="0">
                 <a:latin typeface="Consolas" pitchFamily="49" charset="0"/>
               </a:rPr>
-              <a:t>ObjectComparer</a:t>
+              <a:t>ObjectGraphComparer</a:t>
             </a:r>
             <a:r>
               <a:rPr lang="en-US" dirty="0" smtClean="0">
                 <a:latin typeface="Consolas" pitchFamily="49" charset="0"/>
               </a:rPr>
-              <a:t>(f);</a:t>
-            </a:r>
-          </a:p>
-          <a:p>
+              <a:t>(f</a:t>
+            </a:r>
             <a:r>
               <a:rPr lang="en-US" dirty="0" smtClean="0">
                 <a:latin typeface="Consolas" pitchFamily="49" charset="0"/>
               </a:rPr>
-              <a:t> </a:t>
-            </a:r>
-          </a:p>
-          <a:p>
-            <a:r>
-              <a:rPr lang="en-US" dirty="0" err="1" smtClean="0">
-                <a:latin typeface="Consolas" pitchFamily="49" charset="0"/>
-              </a:rPr>
-              <a:t>bool</a:t>
-            </a:r>
-            <a:r>
-              <a:rPr lang="en-US" dirty="0" smtClean="0">
-                <a:latin typeface="Consolas" pitchFamily="49" charset="0"/>
-              </a:rPr>
-              <a:t> match = </a:t>
-            </a:r>
-            <a:r>
-              <a:rPr lang="en-US" dirty="0" err="1" smtClean="0">
-                <a:latin typeface="Consolas" pitchFamily="49" charset="0"/>
-              </a:rPr>
-              <a:t>c.</a:t>
-            </a:r>
+              <a:t>);</a:t>
+            </a:r>
+          </a:p>
+          <a:p>
             <a:r>
               <a:rPr lang="en-US" b="1" dirty="0" err="1" smtClean="0">
                 <a:solidFill>
@@ -10985,14 +10510,128 @@
                 </a:solidFill>
                 <a:latin typeface="Consolas" pitchFamily="49" charset="0"/>
               </a:rPr>
+              <a:t>GraphNode</a:t>
+            </a:r>
+            <a:r>
+              <a:rPr lang="en-US" b="1" dirty="0" smtClean="0">
+                <a:solidFill>
+                  <a:schemeClr val="accent1"/>
+                </a:solidFill>
+                <a:latin typeface="Consolas" pitchFamily="49" charset="0"/>
+              </a:rPr>
+              <a:t> </a:t>
+            </a:r>
+            <a:r>
+              <a:rPr lang="en-US" dirty="0" smtClean="0">
+                <a:latin typeface="Consolas" pitchFamily="49" charset="0"/>
+              </a:rPr>
+              <a:t>l = </a:t>
+            </a:r>
+            <a:r>
+              <a:rPr lang="en-US" dirty="0" err="1" smtClean="0">
+                <a:latin typeface="Consolas" pitchFamily="49" charset="0"/>
+              </a:rPr>
+              <a:t>f.CreateObjectGraph</a:t>
+            </a:r>
+            <a:r>
+              <a:rPr lang="en-US" dirty="0" smtClean="0">
+                <a:latin typeface="Consolas" pitchFamily="49" charset="0"/>
+              </a:rPr>
+              <a:t>(o1);</a:t>
+            </a:r>
+          </a:p>
+          <a:p>
+            <a:r>
+              <a:rPr lang="en-US" b="1" dirty="0" err="1">
+                <a:solidFill>
+                  <a:schemeClr val="accent1"/>
+                </a:solidFill>
+                <a:latin typeface="Consolas" pitchFamily="49" charset="0"/>
+              </a:rPr>
+              <a:t>GraphNode</a:t>
+            </a:r>
+            <a:r>
+              <a:rPr lang="en-US" b="1" dirty="0">
+                <a:solidFill>
+                  <a:schemeClr val="accent1"/>
+                </a:solidFill>
+                <a:latin typeface="Consolas" pitchFamily="49" charset="0"/>
+              </a:rPr>
+              <a:t> </a:t>
+            </a:r>
+            <a:r>
+              <a:rPr lang="en-US" dirty="0" smtClean="0">
+                <a:latin typeface="Consolas" pitchFamily="49" charset="0"/>
+              </a:rPr>
+              <a:t>r </a:t>
+            </a:r>
+            <a:r>
+              <a:rPr lang="en-US" dirty="0">
+                <a:latin typeface="Consolas" pitchFamily="49" charset="0"/>
+              </a:rPr>
+              <a:t>= </a:t>
+            </a:r>
+            <a:r>
+              <a:rPr lang="en-US" dirty="0" err="1" smtClean="0">
+                <a:latin typeface="Consolas" pitchFamily="49" charset="0"/>
+              </a:rPr>
+              <a:t>f.CreateObjectGraph</a:t>
+            </a:r>
+            <a:r>
+              <a:rPr lang="en-US" dirty="0" smtClean="0">
+                <a:latin typeface="Consolas" pitchFamily="49" charset="0"/>
+              </a:rPr>
+              <a:t>(o2);</a:t>
+            </a:r>
+            <a:endParaRPr lang="en-US" dirty="0">
+              <a:latin typeface="Consolas" pitchFamily="49" charset="0"/>
+            </a:endParaRPr>
+          </a:p>
+          <a:p>
+            <a:r>
+              <a:rPr lang="en-US" dirty="0" smtClean="0">
+                <a:latin typeface="Consolas" pitchFamily="49" charset="0"/>
+              </a:rPr>
+              <a:t> </a:t>
+            </a:r>
+          </a:p>
+          <a:p>
+            <a:r>
+              <a:rPr lang="en-US" dirty="0" err="1" smtClean="0">
+                <a:latin typeface="Consolas" pitchFamily="49" charset="0"/>
+              </a:rPr>
+              <a:t>bool</a:t>
+            </a:r>
+            <a:r>
+              <a:rPr lang="en-US" dirty="0" smtClean="0">
+                <a:latin typeface="Consolas" pitchFamily="49" charset="0"/>
+              </a:rPr>
+              <a:t> match = </a:t>
+            </a:r>
+            <a:r>
+              <a:rPr lang="en-US" dirty="0" err="1" smtClean="0">
+                <a:latin typeface="Consolas" pitchFamily="49" charset="0"/>
+              </a:rPr>
+              <a:t>c.</a:t>
+            </a:r>
+            <a:r>
+              <a:rPr lang="en-US" b="1" dirty="0" err="1" smtClean="0">
+                <a:solidFill>
+                  <a:schemeClr val="accent1"/>
+                </a:solidFill>
+                <a:latin typeface="Consolas" pitchFamily="49" charset="0"/>
+              </a:rPr>
               <a:t>Compare</a:t>
             </a:r>
             <a:r>
               <a:rPr lang="en-US" dirty="0" smtClean="0">
                 <a:latin typeface="Consolas" pitchFamily="49" charset="0"/>
               </a:rPr>
-              <a:t>(o1, o2);</a:t>
-            </a:r>
+              <a:t>(l, r);</a:t>
+            </a:r>
+            <a:endParaRPr lang="en-US" dirty="0" smtClean="0">
+              <a:latin typeface="Consolas" pitchFamily="49" charset="0"/>
+            </a:endParaRPr>
           </a:p>
           <a:p>
             <a:r>
@@ -11052,6 +10691,16 @@
             </a:endParaRPr>
           </a:p>
           <a:p>
+            <a:endParaRPr lang="en-US" dirty="0" smtClean="0">
+              <a:solidFill>
+                <a:srgbClr val="92D050"/>
+              </a:solidFill>
+              <a:latin typeface="Consolas" pitchFamily="49" charset="0"/>
+              <a:ea typeface="Calibri" pitchFamily="34" charset="0"/>
+              <a:cs typeface="Times New Roman" pitchFamily="18" charset="0"/>
+            </a:endParaRPr>
+          </a:p>
+          <a:p>
             <a:r>
               <a:rPr lang="en-US" dirty="0" smtClean="0">
                 <a:solidFill>
@@ -11061,15 +10710,19 @@
                 <a:ea typeface="Calibri" pitchFamily="34" charset="0"/>
                 <a:cs typeface="Times New Roman" pitchFamily="18" charset="0"/>
               </a:rPr>
-              <a:t>// you can also get a collection of mismatches...</a:t>
-            </a:r>
-          </a:p>
-          <a:p>
-            <a:endParaRPr lang="en-US" dirty="0" smtClean="0">
-              <a:latin typeface="Consolas" pitchFamily="49" charset="0"/>
-              <a:ea typeface="Calibri" pitchFamily="34" charset="0"/>
-              <a:cs typeface="Times New Roman" pitchFamily="18" charset="0"/>
-            </a:endParaRPr>
+              <a:t>// </a:t>
+            </a:r>
+            <a:r>
+              <a:rPr lang="en-US" dirty="0" smtClean="0">
+                <a:solidFill>
+                  <a:srgbClr val="92D050"/>
+                </a:solidFill>
+                <a:latin typeface="Consolas" pitchFamily="49" charset="0"/>
+                <a:ea typeface="Calibri" pitchFamily="34" charset="0"/>
+                <a:cs typeface="Times New Roman" pitchFamily="18" charset="0"/>
+              </a:rPr>
+              <a:t>you can also get a collection of mismatches...</a:t>
+            </a:r>
           </a:p>
           <a:p>
             <a:r>
@@ -11086,7 +10739,15 @@
                 <a:ea typeface="Calibri" pitchFamily="34" charset="0"/>
                 <a:cs typeface="Times New Roman" pitchFamily="18" charset="0"/>
               </a:rPr>
-              <a:t> match = </a:t>
+              <a:t> </a:t>
+            </a:r>
+            <a:r>
+              <a:rPr lang="en-US" sz="1600" dirty="0" smtClean="0">
+                <a:latin typeface="Lucida Console" pitchFamily="49" charset="0"/>
+                <a:ea typeface="Calibri" pitchFamily="34" charset="0"/>
+                <a:cs typeface="Times New Roman" pitchFamily="18" charset="0"/>
+              </a:rPr>
+              <a:t>match = </a:t>
             </a:r>
             <a:r>
               <a:rPr lang="en-US" sz="1600" dirty="0" err="1" smtClean="0">
@@ -11102,7 +10763,15 @@
                 <a:ea typeface="Calibri" pitchFamily="34" charset="0"/>
                 <a:cs typeface="Times New Roman" pitchFamily="18" charset="0"/>
               </a:rPr>
-              <a:t>(o1, o2, out mismatches);</a:t>
+              <a:t>(l, r, </a:t>
+            </a:r>
+            <a:r>
+              <a:rPr lang="en-US" sz="1600" dirty="0" smtClean="0">
+                <a:latin typeface="Lucida Console" pitchFamily="49" charset="0"/>
+                <a:ea typeface="Calibri" pitchFamily="34" charset="0"/>
+                <a:cs typeface="Times New Roman" pitchFamily="18" charset="0"/>
+              </a:rPr>
+              <a:t>out mismatches);</a:t>
             </a:r>
           </a:p>
           <a:p>
@@ -11125,13 +10794,13 @@
         </p:nvSpPr>
         <p:spPr>
           <a:xfrm>
-            <a:off x="4876800" y="2667000"/>
-            <a:ext cx="4876800" cy="2133600"/>
+            <a:off x="5042647" y="2895600"/>
+            <a:ext cx="4648200" cy="1344068"/>
           </a:xfrm>
           <a:prstGeom prst="cloudCallout">
             <a:avLst>
-              <a:gd name="adj1" fmla="val -18732"/>
-              <a:gd name="adj2" fmla="val -67636"/>
+              <a:gd name="adj1" fmla="val -17575"/>
+              <a:gd name="adj2" fmla="val -97650"/>
             </a:avLst>
           </a:prstGeom>
         </p:spPr>
@@ -11177,13 +10846,13 @@
         </p:nvSpPr>
         <p:spPr>
           <a:xfrm>
-            <a:off x="2286000" y="5791200"/>
-            <a:ext cx="5257800" cy="1295400"/>
+            <a:off x="3657600" y="4572000"/>
+            <a:ext cx="5943600" cy="990600"/>
           </a:xfrm>
           <a:prstGeom prst="cloudCallout">
             <a:avLst>
-              <a:gd name="adj1" fmla="val 16946"/>
-              <a:gd name="adj2" fmla="val -69289"/>
+              <a:gd name="adj1" fmla="val -16145"/>
+              <a:gd name="adj2" fmla="val 111514"/>
             </a:avLst>
           </a:prstGeom>
         </p:spPr>
@@ -11532,11 +11201,7 @@
         </p:txBody>
       </p:sp>
     </p:spTree>
-    <p:extLst>
-      <p:ext uri="{BB962C8B-B14F-4D97-AF65-F5344CB8AC3E}">
-        <p14:creationId xmlns="" xmlns:p14="http://schemas.microsoft.com/office/powerpoint/2007/7/12/main" val="3562839318"/>
-      </p:ext>
-    </p:extLst>
+    <p:extLst/>
   </p:cSld>
   <p:clrMapOvr>
     <a:masterClrMapping/>
@@ -12233,6 +11898,50 @@
               </a:rPr>
               <a:t> d = </a:t>
             </a:r>
+          </a:p>
+          <a:p>
+            <a:r>
+              <a:rPr lang="en-US" dirty="0" smtClean="0">
+                <a:latin typeface="Consolas" pitchFamily="49" charset="0"/>
+                <a:ea typeface="Calibri" pitchFamily="34" charset="0"/>
+                <a:cs typeface="Times New Roman" pitchFamily="18" charset="0"/>
+              </a:rPr>
+              <a:t>    </a:t>
+            </a:r>
+            <a:r>
+              <a:rPr lang="en-US" dirty="0" err="1" smtClean="0">
+                <a:latin typeface="Consolas" pitchFamily="49" charset="0"/>
+                <a:ea typeface="Calibri" pitchFamily="34" charset="0"/>
+                <a:cs typeface="Times New Roman" pitchFamily="18" charset="0"/>
+              </a:rPr>
+              <a:t>CommandLineDictionary.FromArguments</a:t>
+            </a:r>
+            <a:r>
+              <a:rPr lang="en-US" dirty="0" smtClean="0">
+                <a:latin typeface="Consolas" pitchFamily="49" charset="0"/>
+                <a:ea typeface="Calibri" pitchFamily="34" charset="0"/>
+                <a:cs typeface="Times New Roman" pitchFamily="18" charset="0"/>
+              </a:rPr>
+              <a:t>(</a:t>
+            </a:r>
+            <a:r>
+              <a:rPr lang="en-US" dirty="0" err="1" smtClean="0">
+                <a:latin typeface="Consolas" pitchFamily="49" charset="0"/>
+                <a:ea typeface="Calibri" pitchFamily="34" charset="0"/>
+                <a:cs typeface="Times New Roman" pitchFamily="18" charset="0"/>
+              </a:rPr>
+              <a:t>args</a:t>
+            </a:r>
+            <a:r>
+              <a:rPr lang="en-US" dirty="0" smtClean="0">
+                <a:latin typeface="Consolas" pitchFamily="49" charset="0"/>
+                <a:ea typeface="Calibri" pitchFamily="34" charset="0"/>
+                <a:cs typeface="Times New Roman" pitchFamily="18" charset="0"/>
+              </a:rPr>
+              <a:t>)</a:t>
+            </a:r>
+          </a:p>
+          <a:p>
             <a:endParaRPr lang="en-US" dirty="0" smtClean="0">
               <a:latin typeface="Consolas" pitchFamily="49" charset="0"/>
               <a:ea typeface="Calibri" pitchFamily="34" charset="0"/>
@@ -12241,20 +11950,70 @@
           </a:p>
           <a:p>
             <a:r>
+              <a:rPr lang="en-US" dirty="0" err="1" smtClean="0">
+                <a:latin typeface="Consolas" pitchFamily="49" charset="0"/>
+                <a:ea typeface="Calibri" pitchFamily="34" charset="0"/>
+                <a:cs typeface="Times New Roman" pitchFamily="18" charset="0"/>
+              </a:rPr>
+              <a:t>bool</a:t>
+            </a:r>
+            <a:r>
               <a:rPr lang="en-US" dirty="0" smtClean="0">
                 <a:latin typeface="Consolas" pitchFamily="49" charset="0"/>
                 <a:ea typeface="Calibri" pitchFamily="34" charset="0"/>
                 <a:cs typeface="Times New Roman" pitchFamily="18" charset="0"/>
               </a:rPr>
+              <a:t> verbose = </a:t>
+            </a:r>
+            <a:r>
+              <a:rPr lang="en-US" dirty="0" err="1" smtClean="0">
+                <a:latin typeface="Consolas" pitchFamily="49" charset="0"/>
+                <a:ea typeface="Calibri" pitchFamily="34" charset="0"/>
+                <a:cs typeface="Times New Roman" pitchFamily="18" charset="0"/>
+              </a:rPr>
+              <a:t>d.ContainsKey</a:t>
+            </a:r>
+            <a:r>
+              <a:rPr lang="en-US" dirty="0" smtClean="0">
+                <a:latin typeface="Consolas" pitchFamily="49" charset="0"/>
+                <a:ea typeface="Calibri" pitchFamily="34" charset="0"/>
+                <a:cs typeface="Times New Roman" pitchFamily="18" charset="0"/>
+              </a:rPr>
+              <a:t>("verbose");</a:t>
+            </a:r>
+          </a:p>
+          <a:p>
+            <a:r>
+              <a:rPr lang="en-US" dirty="0" err="1" smtClean="0">
+                <a:latin typeface="Consolas" pitchFamily="49" charset="0"/>
+                <a:ea typeface="Calibri" pitchFamily="34" charset="0"/>
+                <a:cs typeface="Times New Roman" pitchFamily="18" charset="0"/>
+              </a:rPr>
+              <a:t>int</a:t>
+            </a:r>
+            <a:r>
+              <a:rPr lang="en-US" dirty="0" smtClean="0">
+                <a:latin typeface="Consolas" pitchFamily="49" charset="0"/>
+                <a:ea typeface="Calibri" pitchFamily="34" charset="0"/>
+                <a:cs typeface="Times New Roman" pitchFamily="18" charset="0"/>
+              </a:rPr>
               <a:t> </a:t>
             </a:r>
             <a:r>
+              <a:rPr lang="en-US" dirty="0" err="1" smtClean="0">
+                <a:latin typeface="Consolas" pitchFamily="49" charset="0"/>
+                <a:ea typeface="Calibri" pitchFamily="34" charset="0"/>
+                <a:cs typeface="Times New Roman" pitchFamily="18" charset="0"/>
+              </a:rPr>
+              <a:t>testId</a:t>
+            </a:r>
+            <a:r>
               <a:rPr lang="en-US" dirty="0" smtClean="0">
                 <a:latin typeface="Consolas" pitchFamily="49" charset="0"/>
                 <a:ea typeface="Calibri" pitchFamily="34" charset="0"/>
                 <a:cs typeface="Times New Roman" pitchFamily="18" charset="0"/>
               </a:rPr>
-              <a:t>   </a:t>
+              <a:t> = Int32.Parse(d["</a:t>
             </a:r>
             <a:r>
               <a:rPr lang="en-US" dirty="0" err="1" smtClean="0">
@@ -12262,7 +12021,7 @@
                 <a:ea typeface="Calibri" pitchFamily="34" charset="0"/>
                 <a:cs typeface="Times New Roman" pitchFamily="18" charset="0"/>
               </a:rPr>
-              <a:t>CommandLineDictionary.FromArguments</a:t>
+              <a:t>testId</a:t>
             </a:r>
             <a:r>
               <a:rPr lang="en-US" dirty="0" smtClean="0">
@@ -12270,23 +12029,7 @@
                 <a:ea typeface="Calibri" pitchFamily="34" charset="0"/>
                 <a:cs typeface="Times New Roman" pitchFamily="18" charset="0"/>
               </a:rPr>
-              <a:t>(</a:t>
-            </a:r>
-            <a:r>
-              <a:rPr lang="en-US" dirty="0" err="1" smtClean="0">
-                <a:latin typeface="Consolas" pitchFamily="49" charset="0"/>
-                <a:ea typeface="Calibri" pitchFamily="34" charset="0"/>
-                <a:cs typeface="Times New Roman" pitchFamily="18" charset="0"/>
-              </a:rPr>
-              <a:t>args</a:t>
-            </a:r>
-            <a:r>
-              <a:rPr lang="en-US" dirty="0" smtClean="0">
-                <a:latin typeface="Consolas" pitchFamily="49" charset="0"/>
-                <a:ea typeface="Calibri" pitchFamily="34" charset="0"/>
-                <a:cs typeface="Times New Roman" pitchFamily="18" charset="0"/>
-              </a:rPr>
-              <a:t>)</a:t>
+              <a:t>"]);</a:t>
             </a:r>
           </a:p>
           <a:p>
@@ -12298,86 +12041,28 @@
           </a:p>
           <a:p>
             <a:r>
-              <a:rPr lang="en-US" dirty="0" err="1" smtClean="0">
-                <a:latin typeface="Consolas" pitchFamily="49" charset="0"/>
-                <a:ea typeface="Calibri" pitchFamily="34" charset="0"/>
-                <a:cs typeface="Times New Roman" pitchFamily="18" charset="0"/>
-              </a:rPr>
-              <a:t>bool</a:t>
-            </a:r>
-            <a:r>
               <a:rPr lang="en-US" dirty="0" smtClean="0">
-                <a:latin typeface="Consolas" pitchFamily="49" charset="0"/>
-                <a:ea typeface="Calibri" pitchFamily="34" charset="0"/>
-                <a:cs typeface="Times New Roman" pitchFamily="18" charset="0"/>
-              </a:rPr>
-              <a:t> verbose = </a:t>
-            </a:r>
-            <a:r>
-              <a:rPr lang="en-US" dirty="0" err="1" smtClean="0">
-                <a:latin typeface="Consolas" pitchFamily="49" charset="0"/>
-                <a:ea typeface="Calibri" pitchFamily="34" charset="0"/>
-                <a:cs typeface="Times New Roman" pitchFamily="18" charset="0"/>
-              </a:rPr>
-              <a:t>d.ContainsKey</a:t>
-            </a:r>
+                <a:solidFill>
+                  <a:srgbClr val="92D050"/>
+                </a:solidFill>
+                <a:latin typeface="Consolas" pitchFamily="49" charset="0"/>
+                <a:ea typeface="Calibri" pitchFamily="34" charset="0"/>
+                <a:cs typeface="Times New Roman" pitchFamily="18" charset="0"/>
+              </a:rPr>
+              <a:t>// Example 2:</a:t>
+            </a:r>
+          </a:p>
+          <a:p>
             <a:r>
               <a:rPr lang="en-US" dirty="0" smtClean="0">
-                <a:latin typeface="Consolas" pitchFamily="49" charset="0"/>
-                <a:ea typeface="Calibri" pitchFamily="34" charset="0"/>
-                <a:cs typeface="Times New Roman" pitchFamily="18" charset="0"/>
-              </a:rPr>
-              <a:t>("verbose");</a:t>
-            </a:r>
-          </a:p>
-          <a:p>
-            <a:r>
-              <a:rPr lang="en-US" dirty="0" err="1" smtClean="0">
-                <a:latin typeface="Consolas" pitchFamily="49" charset="0"/>
-                <a:ea typeface="Calibri" pitchFamily="34" charset="0"/>
-                <a:cs typeface="Times New Roman" pitchFamily="18" charset="0"/>
-              </a:rPr>
-              <a:t>int</a:t>
-            </a:r>
-            <a:r>
-              <a:rPr lang="en-US" dirty="0" smtClean="0">
-                <a:latin typeface="Consolas" pitchFamily="49" charset="0"/>
-                <a:ea typeface="Calibri" pitchFamily="34" charset="0"/>
-                <a:cs typeface="Times New Roman" pitchFamily="18" charset="0"/>
-              </a:rPr>
-              <a:t> </a:t>
-            </a:r>
-            <a:r>
-              <a:rPr lang="en-US" dirty="0" err="1" smtClean="0">
-                <a:latin typeface="Consolas" pitchFamily="49" charset="0"/>
-                <a:ea typeface="Calibri" pitchFamily="34" charset="0"/>
-                <a:cs typeface="Times New Roman" pitchFamily="18" charset="0"/>
-              </a:rPr>
-              <a:t>testId</a:t>
-            </a:r>
-            <a:r>
-              <a:rPr lang="en-US" dirty="0" smtClean="0">
-                <a:latin typeface="Consolas" pitchFamily="49" charset="0"/>
-                <a:ea typeface="Calibri" pitchFamily="34" charset="0"/>
-                <a:cs typeface="Times New Roman" pitchFamily="18" charset="0"/>
-              </a:rPr>
-              <a:t> = Int32.Parse(d["</a:t>
-            </a:r>
-            <a:r>
-              <a:rPr lang="en-US" dirty="0" err="1" smtClean="0">
-                <a:latin typeface="Consolas" pitchFamily="49" charset="0"/>
-                <a:ea typeface="Calibri" pitchFamily="34" charset="0"/>
-                <a:cs typeface="Times New Roman" pitchFamily="18" charset="0"/>
-              </a:rPr>
-              <a:t>testId</a:t>
-            </a:r>
-            <a:r>
-              <a:rPr lang="en-US" dirty="0" smtClean="0">
-                <a:latin typeface="Consolas" pitchFamily="49" charset="0"/>
-                <a:ea typeface="Calibri" pitchFamily="34" charset="0"/>
-                <a:cs typeface="Times New Roman" pitchFamily="18" charset="0"/>
-              </a:rPr>
-              <a:t>"]);</a:t>
+                <a:solidFill>
+                  <a:srgbClr val="92D050"/>
+                </a:solidFill>
+                <a:latin typeface="Consolas" pitchFamily="49" charset="0"/>
+                <a:ea typeface="Calibri" pitchFamily="34" charset="0"/>
+                <a:cs typeface="Times New Roman" pitchFamily="18" charset="0"/>
+              </a:rPr>
+              <a:t>// Parse the same into a structure</a:t>
             </a:r>
           </a:p>
           <a:p>
@@ -12390,30 +12075,20 @@
           <a:p>
             <a:r>
               <a:rPr lang="en-US" dirty="0" smtClean="0">
-                <a:solidFill>
-                  <a:srgbClr val="92D050"/>
-                </a:solidFill>
-                <a:latin typeface="Consolas" pitchFamily="49" charset="0"/>
-                <a:ea typeface="Calibri" pitchFamily="34" charset="0"/>
-                <a:cs typeface="Times New Roman" pitchFamily="18" charset="0"/>
-              </a:rPr>
-              <a:t>// Example 2:</a:t>
-            </a:r>
-          </a:p>
-          <a:p>
-            <a:r>
-              <a:rPr lang="en-US" dirty="0" smtClean="0">
-                <a:solidFill>
-                  <a:srgbClr val="92D050"/>
-                </a:solidFill>
-                <a:latin typeface="Consolas" pitchFamily="49" charset="0"/>
-                <a:ea typeface="Calibri" pitchFamily="34" charset="0"/>
-                <a:cs typeface="Times New Roman" pitchFamily="18" charset="0"/>
-              </a:rPr>
-              <a:t>// Parse the same into a structure</a:t>
-            </a:r>
-          </a:p>
-          <a:p>
+                <a:latin typeface="Consolas" pitchFamily="49" charset="0"/>
+                <a:ea typeface="Calibri" pitchFamily="34" charset="0"/>
+                <a:cs typeface="Times New Roman" pitchFamily="18" charset="0"/>
+              </a:rPr>
+              <a:t>public class </a:t>
+            </a:r>
+            <a:r>
+              <a:rPr lang="en-US" dirty="0" err="1" smtClean="0">
+                <a:latin typeface="Consolas" pitchFamily="49" charset="0"/>
+                <a:ea typeface="Calibri" pitchFamily="34" charset="0"/>
+                <a:cs typeface="Times New Roman" pitchFamily="18" charset="0"/>
+              </a:rPr>
+              <a:t>MyArguments</a:t>
+            </a:r>
             <a:endParaRPr lang="en-US" dirty="0" smtClean="0">
               <a:latin typeface="Consolas" pitchFamily="49" charset="0"/>
               <a:ea typeface="Calibri" pitchFamily="34" charset="0"/>
@@ -12427,7 +12102,17 @@
                 <a:ea typeface="Calibri" pitchFamily="34" charset="0"/>
                 <a:cs typeface="Times New Roman" pitchFamily="18" charset="0"/>
               </a:rPr>
-              <a:t>public class </a:t>
+              <a:t>{</a:t>
+            </a:r>
+          </a:p>
+          <a:p>
+            <a:r>
+              <a:rPr lang="en-US" dirty="0" smtClean="0">
+                <a:latin typeface="Consolas" pitchFamily="49" charset="0"/>
+                <a:ea typeface="Calibri" pitchFamily="34" charset="0"/>
+                <a:cs typeface="Times New Roman" pitchFamily="18" charset="0"/>
+              </a:rPr>
+              <a:t>    public </a:t>
             </a:r>
             <a:r>
               <a:rPr lang="en-US" dirty="0" err="1" smtClean="0">
@@ -12435,22 +12120,15 @@
                 <a:ea typeface="Calibri" pitchFamily="34" charset="0"/>
                 <a:cs typeface="Times New Roman" pitchFamily="18" charset="0"/>
               </a:rPr>
-              <a:t>MyArguments</a:t>
-            </a:r>
-            <a:endParaRPr lang="en-US" dirty="0" smtClean="0">
-              <a:latin typeface="Consolas" pitchFamily="49" charset="0"/>
-              <a:ea typeface="Calibri" pitchFamily="34" charset="0"/>
-              <a:cs typeface="Times New Roman" pitchFamily="18" charset="0"/>
-            </a:endParaRPr>
-          </a:p>
-          <a:p>
+              <a:t>bool</a:t>
+            </a:r>
             <a:r>
               <a:rPr lang="en-US" dirty="0" smtClean="0">
                 <a:latin typeface="Consolas" pitchFamily="49" charset="0"/>
                 <a:ea typeface="Calibri" pitchFamily="34" charset="0"/>
                 <a:cs typeface="Times New Roman" pitchFamily="18" charset="0"/>
               </a:rPr>
-              <a:t>{</a:t>
+              <a:t>? Verbose { get; set; }</a:t>
             </a:r>
           </a:p>
           <a:p>
@@ -12460,49 +12138,7 @@
                 <a:ea typeface="Calibri" pitchFamily="34" charset="0"/>
                 <a:cs typeface="Times New Roman" pitchFamily="18" charset="0"/>
               </a:rPr>
-              <a:t>    </a:t>
-            </a:r>
-            <a:r>
-              <a:rPr lang="en-US" dirty="0" smtClean="0">
-                <a:latin typeface="Consolas" pitchFamily="49" charset="0"/>
-                <a:ea typeface="Calibri" pitchFamily="34" charset="0"/>
-                <a:cs typeface="Times New Roman" pitchFamily="18" charset="0"/>
-              </a:rPr>
-              <a:t>public </a:t>
-            </a:r>
-            <a:r>
-              <a:rPr lang="en-US" dirty="0" err="1" smtClean="0">
-                <a:latin typeface="Consolas" pitchFamily="49" charset="0"/>
-                <a:ea typeface="Calibri" pitchFamily="34" charset="0"/>
-                <a:cs typeface="Times New Roman" pitchFamily="18" charset="0"/>
-              </a:rPr>
-              <a:t>bool</a:t>
-            </a:r>
-            <a:r>
-              <a:rPr lang="en-US" dirty="0" smtClean="0">
-                <a:latin typeface="Consolas" pitchFamily="49" charset="0"/>
-                <a:ea typeface="Calibri" pitchFamily="34" charset="0"/>
-                <a:cs typeface="Times New Roman" pitchFamily="18" charset="0"/>
-              </a:rPr>
-              <a:t>? Verbose { get; set; }</a:t>
-            </a:r>
-          </a:p>
-          <a:p>
-            <a:r>
-              <a:rPr lang="en-US" dirty="0" smtClean="0">
-                <a:latin typeface="Consolas" pitchFamily="49" charset="0"/>
-                <a:ea typeface="Calibri" pitchFamily="34" charset="0"/>
-                <a:cs typeface="Times New Roman" pitchFamily="18" charset="0"/>
-              </a:rPr>
-              <a:t>    </a:t>
-            </a:r>
-            <a:r>
-              <a:rPr lang="en-US" dirty="0" smtClean="0">
-                <a:latin typeface="Consolas" pitchFamily="49" charset="0"/>
-                <a:ea typeface="Calibri" pitchFamily="34" charset="0"/>
-                <a:cs typeface="Times New Roman" pitchFamily="18" charset="0"/>
-              </a:rPr>
-              <a:t>public </a:t>
+              <a:t>    public </a:t>
             </a:r>
             <a:r>
               <a:rPr lang="en-US" dirty="0" err="1" smtClean="0">
@@ -13018,11 +12654,7 @@
         </p:txBody>
       </p:sp>
     </p:spTree>
-    <p:extLst>
-      <p:ext uri="{BB962C8B-B14F-4D97-AF65-F5344CB8AC3E}">
-        <p14:creationId xmlns="" xmlns:p14="http://schemas.microsoft.com/office/powerpoint/2007/7/12/main" val="1294337010"/>
-      </p:ext>
-    </p:extLst>
+    <p:extLst/>
   </p:cSld>
   <p:clrMapOvr>
     <a:masterClrMapping/>
@@ -13188,11 +12820,7 @@
         </p:txBody>
       </p:sp>
     </p:spTree>
-    <p:extLst>
-      <p:ext uri="{BB962C8B-B14F-4D97-AF65-F5344CB8AC3E}">
-        <p14:creationId xmlns="" xmlns:p14="http://schemas.microsoft.com/office/powerpoint/2007/7/12/main" val="660189016"/>
-      </p:ext>
-    </p:extLst>
+    <p:extLst/>
   </p:cSld>
   <p:clrMapOvr>
     <a:masterClrMapping/>
@@ -13365,11 +12993,7 @@
         </p:txBody>
       </p:sp>
     </p:spTree>
-    <p:extLst>
-      <p:ext uri="{BB962C8B-B14F-4D97-AF65-F5344CB8AC3E}">
-        <p14:creationId xmlns="" xmlns:p14="http://schemas.microsoft.com/office/powerpoint/2007/7/12/main" val="2047722353"/>
-      </p:ext>
-    </p:extLst>
+    <p:extLst/>
   </p:cSld>
   <p:clrMapOvr>
     <a:masterClrMapping/>
@@ -13594,11 +13218,7 @@
         </p:txBody>
       </p:sp>
     </p:spTree>
-    <p:extLst>
-      <p:ext uri="{BB962C8B-B14F-4D97-AF65-F5344CB8AC3E}">
-        <p14:creationId xmlns="" xmlns:p14="http://schemas.microsoft.com/office/powerpoint/2007/7/12/main" val="2924897450"/>
-      </p:ext>
-    </p:extLst>
+    <p:extLst/>
   </p:cSld>
   <p:clrMapOvr>
     <a:masterClrMapping/>
@@ -13820,11 +13440,7 @@
         </p:txBody>
       </p:sp>
     </p:spTree>
-    <p:extLst>
-      <p:ext uri="{BB962C8B-B14F-4D97-AF65-F5344CB8AC3E}">
-        <p14:creationId xmlns="" xmlns:p14="http://schemas.microsoft.com/office/powerpoint/2007/7/12/main" val="1753245623"/>
-      </p:ext>
-    </p:extLst>
+    <p:extLst/>
   </p:cSld>
   <p:clrMapOvr>
     <a:masterClrMapping/>
@@ -15479,11 +15095,7 @@
         </p:sp>
       </p:grpSp>
     </p:spTree>
-    <p:extLst>
-      <p:ext uri="{BB962C8B-B14F-4D97-AF65-F5344CB8AC3E}">
-        <p14:creationId xmlns="" xmlns:p14="http://schemas.microsoft.com/office/powerpoint/2007/7/12/main" val="2215057904"/>
-      </p:ext>
-    </p:extLst>
+    <p:extLst/>
   </p:cSld>
   <p:clrMapOvr>
     <a:masterClrMapping/>
@@ -15673,11 +15285,7 @@
         </p:txBody>
       </p:sp>
     </p:spTree>
-    <p:extLst>
-      <p:ext uri="{BB962C8B-B14F-4D97-AF65-F5344CB8AC3E}">
-        <p14:creationId xmlns="" xmlns:p14="http://schemas.microsoft.com/office/powerpoint/2007/7/12/main" val="284500314"/>
-      </p:ext>
-    </p:extLst>
+    <p:extLst/>
   </p:cSld>
   <p:clrMapOvr>
     <a:masterClrMapping/>
@@ -15851,11 +15459,7 @@
         </p:txBody>
       </p:sp>
     </p:spTree>
-    <p:extLst>
-      <p:ext uri="{BB962C8B-B14F-4D97-AF65-F5344CB8AC3E}">
-        <p14:creationId xmlns="" xmlns:p14="http://schemas.microsoft.com/office/powerpoint/2007/7/12/main" val="2014843678"/>
-      </p:ext>
-    </p:extLst>
+    <p:extLst/>
   </p:cSld>
   <p:clrMapOvr>
     <a:masterClrMapping/>
@@ -15930,15 +15534,7 @@
           <a:prstGeom prst="rect">
             <a:avLst/>
           </a:prstGeom>
-          <a:extLst>
-            <a:ext uri="{909E8E84-426E-40dd-AFC4-6F175D3DCCD1}">
-              <a14:hiddenFill xmlns="" xmlns:a14="http://schemas.microsoft.com/office/drawing/2007/7/7/main">
-                <a:solidFill>
-                  <a:srgbClr xmlns:mc="http://schemas.openxmlformats.org/markup-compatibility/2006" val="FFFFFF" mc:Ignorable=""/>
-                </a:solidFill>
-              </a14:hiddenFill>
-            </a:ext>
-          </a:extLst>
+          <a:extLst/>
         </p:spPr>
         <p:txBody>
           <a:bodyPr vert="horz" wrap="square" lIns="91440" tIns="45720" rIns="91440" bIns="45720" numCol="1" anchor="t" anchorCtr="0" compatLnSpc="1">
@@ -16012,11 +15608,7 @@
         </p:txBody>
       </p:sp>
     </p:spTree>
-    <p:extLst>
-      <p:ext uri="{BB962C8B-B14F-4D97-AF65-F5344CB8AC3E}">
-        <p14:creationId xmlns="" xmlns:p14="http://schemas.microsoft.com/office/powerpoint/2007/7/12/main" val="3584037512"/>
-      </p:ext>
-    </p:extLst>
+    <p:extLst/>
   </p:cSld>
   <p:clrMapOvr>
     <a:masterClrMapping/>

</xml_diff>